<commit_message>
Added API data demo
</commit_message>
<xml_diff>
--- a/React js AP LAB.pptx
+++ b/React js AP LAB.pptx
@@ -361,7 +361,7 @@
           <a:p>
             <a:fld id="{675B5045-26FF-426B-B3F5-2A1A966DEC08}" type="datetimeFigureOut">
               <a:rPr lang="en-US" smtClean="0"/>
-              <a:t>4/14/2019</a:t>
+              <a:t>4/15/2019</a:t>
             </a:fld>
             <a:endParaRPr lang="en-US"/>
           </a:p>
@@ -526,7 +526,7 @@
           <a:p>
             <a:fld id="{675B5045-26FF-426B-B3F5-2A1A966DEC08}" type="datetimeFigureOut">
               <a:rPr lang="en-US" smtClean="0"/>
-              <a:t>4/14/2019</a:t>
+              <a:t>4/15/2019</a:t>
             </a:fld>
             <a:endParaRPr lang="en-US"/>
           </a:p>
@@ -701,7 +701,7 @@
           <a:p>
             <a:fld id="{675B5045-26FF-426B-B3F5-2A1A966DEC08}" type="datetimeFigureOut">
               <a:rPr lang="en-US" smtClean="0"/>
-              <a:t>4/14/2019</a:t>
+              <a:t>4/15/2019</a:t>
             </a:fld>
             <a:endParaRPr lang="en-US"/>
           </a:p>
@@ -884,7 +884,7 @@
           <a:p>
             <a:fld id="{675B5045-26FF-426B-B3F5-2A1A966DEC08}" type="datetimeFigureOut">
               <a:rPr lang="en-US" smtClean="0"/>
-              <a:t>4/14/2019</a:t>
+              <a:t>4/15/2019</a:t>
             </a:fld>
             <a:endParaRPr lang="en-US"/>
           </a:p>
@@ -1146,7 +1146,7 @@
           <a:p>
             <a:fld id="{675B5045-26FF-426B-B3F5-2A1A966DEC08}" type="datetimeFigureOut">
               <a:rPr lang="en-US" smtClean="0"/>
-              <a:t>4/14/2019</a:t>
+              <a:t>4/15/2019</a:t>
             </a:fld>
             <a:endParaRPr lang="en-US"/>
           </a:p>
@@ -1494,7 +1494,7 @@
           <a:p>
             <a:fld id="{675B5045-26FF-426B-B3F5-2A1A966DEC08}" type="datetimeFigureOut">
               <a:rPr lang="en-US" smtClean="0"/>
-              <a:t>4/14/2019</a:t>
+              <a:t>4/15/2019</a:t>
             </a:fld>
             <a:endParaRPr lang="en-US"/>
           </a:p>
@@ -1802,7 +1802,7 @@
           <a:p>
             <a:fld id="{675B5045-26FF-426B-B3F5-2A1A966DEC08}" type="datetimeFigureOut">
               <a:rPr lang="en-US" smtClean="0"/>
-              <a:t>4/14/2019</a:t>
+              <a:t>4/15/2019</a:t>
             </a:fld>
             <a:endParaRPr lang="en-US"/>
           </a:p>
@@ -2029,7 +2029,7 @@
           <a:p>
             <a:fld id="{675B5045-26FF-426B-B3F5-2A1A966DEC08}" type="datetimeFigureOut">
               <a:rPr lang="en-US" smtClean="0"/>
-              <a:t>4/14/2019</a:t>
+              <a:t>4/15/2019</a:t>
             </a:fld>
             <a:endParaRPr lang="en-US"/>
           </a:p>
@@ -2119,7 +2119,7 @@
           <a:p>
             <a:fld id="{675B5045-26FF-426B-B3F5-2A1A966DEC08}" type="datetimeFigureOut">
               <a:rPr lang="en-US" smtClean="0"/>
-              <a:t>4/14/2019</a:t>
+              <a:t>4/15/2019</a:t>
             </a:fld>
             <a:endParaRPr lang="en-US"/>
           </a:p>
@@ -2407,7 +2407,7 @@
           <a:p>
             <a:fld id="{675B5045-26FF-426B-B3F5-2A1A966DEC08}" type="datetimeFigureOut">
               <a:rPr lang="en-US" smtClean="0"/>
-              <a:t>4/14/2019</a:t>
+              <a:t>4/15/2019</a:t>
             </a:fld>
             <a:endParaRPr lang="en-US"/>
           </a:p>
@@ -2676,7 +2676,7 @@
           <a:p>
             <a:fld id="{675B5045-26FF-426B-B3F5-2A1A966DEC08}" type="datetimeFigureOut">
               <a:rPr lang="en-US" smtClean="0"/>
-              <a:t>4/14/2019</a:t>
+              <a:t>4/15/2019</a:t>
             </a:fld>
             <a:endParaRPr lang="en-US"/>
           </a:p>
@@ -2886,7 +2886,7 @@
           <a:p>
             <a:fld id="{675B5045-26FF-426B-B3F5-2A1A966DEC08}" type="datetimeFigureOut">
               <a:rPr lang="en-US" smtClean="0"/>
-              <a:t>4/14/2019</a:t>
+              <a:t>4/15/2019</a:t>
             </a:fld>
             <a:endParaRPr lang="en-US"/>
           </a:p>
@@ -3444,13 +3444,13 @@
   <p:clrMapOvr>
     <a:masterClrMapping/>
   </p:clrMapOvr>
-  <mc:AlternateContent xmlns:mc="http://schemas.openxmlformats.org/markup-compatibility/2006">
-    <mc:Choice xmlns:p14="http://schemas.microsoft.com/office/powerpoint/2010/main" Requires="p14">
+  <mc:AlternateContent xmlns:mc="http://schemas.openxmlformats.org/markup-compatibility/2006" xmlns:p14="http://schemas.microsoft.com/office/powerpoint/2010/main">
+    <mc:Choice Requires="p14">
       <p:transition spd="med" p14:dur="700">
         <p:fade/>
       </p:transition>
     </mc:Choice>
-    <mc:Fallback>
+    <mc:Fallback xmlns="">
       <p:transition spd="med">
         <p:fade/>
       </p:transition>
@@ -3556,13 +3556,13 @@
   <p:clrMapOvr>
     <a:masterClrMapping/>
   </p:clrMapOvr>
-  <mc:AlternateContent xmlns:mc="http://schemas.openxmlformats.org/markup-compatibility/2006">
-    <mc:Choice xmlns:p14="http://schemas.microsoft.com/office/powerpoint/2010/main" Requires="p14">
+  <mc:AlternateContent xmlns:mc="http://schemas.openxmlformats.org/markup-compatibility/2006" xmlns:p14="http://schemas.microsoft.com/office/powerpoint/2010/main">
+    <mc:Choice Requires="p14">
       <p:transition spd="med" p14:dur="700">
         <p:fade/>
       </p:transition>
     </mc:Choice>
-    <mc:Fallback>
+    <mc:Fallback xmlns="">
       <p:transition spd="med">
         <p:fade/>
       </p:transition>
@@ -3718,13 +3718,13 @@
   <p:clrMapOvr>
     <a:masterClrMapping/>
   </p:clrMapOvr>
-  <mc:AlternateContent xmlns:mc="http://schemas.openxmlformats.org/markup-compatibility/2006">
-    <mc:Choice xmlns:p14="http://schemas.microsoft.com/office/powerpoint/2010/main" Requires="p14">
+  <mc:AlternateContent xmlns:mc="http://schemas.openxmlformats.org/markup-compatibility/2006" xmlns:p14="http://schemas.microsoft.com/office/powerpoint/2010/main">
+    <mc:Choice Requires="p14">
       <p:transition spd="med" p14:dur="700">
         <p:fade/>
       </p:transition>
     </mc:Choice>
-    <mc:Fallback>
+    <mc:Fallback xmlns="">
       <p:transition spd="med">
         <p:fade/>
       </p:transition>
@@ -4003,13 +4003,13 @@
   <p:clrMapOvr>
     <a:masterClrMapping/>
   </p:clrMapOvr>
-  <mc:AlternateContent xmlns:mc="http://schemas.openxmlformats.org/markup-compatibility/2006">
-    <mc:Choice xmlns:p14="http://schemas.microsoft.com/office/powerpoint/2010/main" Requires="p14">
+  <mc:AlternateContent xmlns:mc="http://schemas.openxmlformats.org/markup-compatibility/2006" xmlns:p14="http://schemas.microsoft.com/office/powerpoint/2010/main">
+    <mc:Choice Requires="p14">
       <p:transition spd="med" p14:dur="700">
         <p:fade/>
       </p:transition>
     </mc:Choice>
-    <mc:Fallback>
+    <mc:Fallback xmlns="">
       <p:transition spd="med">
         <p:fade/>
       </p:transition>
@@ -4391,13 +4391,13 @@
   <p:clrMapOvr>
     <a:masterClrMapping/>
   </p:clrMapOvr>
-  <mc:AlternateContent xmlns:mc="http://schemas.openxmlformats.org/markup-compatibility/2006">
-    <mc:Choice xmlns:p14="http://schemas.microsoft.com/office/powerpoint/2010/main" Requires="p14">
+  <mc:AlternateContent xmlns:mc="http://schemas.openxmlformats.org/markup-compatibility/2006" xmlns:p14="http://schemas.microsoft.com/office/powerpoint/2010/main">
+    <mc:Choice Requires="p14">
       <p:transition spd="med" p14:dur="700">
         <p:fade/>
       </p:transition>
     </mc:Choice>
-    <mc:Fallback>
+    <mc:Fallback xmlns="">
       <p:transition spd="med">
         <p:fade/>
       </p:transition>
@@ -4617,13 +4617,13 @@
   <p:clrMapOvr>
     <a:masterClrMapping/>
   </p:clrMapOvr>
-  <mc:AlternateContent xmlns:mc="http://schemas.openxmlformats.org/markup-compatibility/2006">
-    <mc:Choice xmlns:p14="http://schemas.microsoft.com/office/powerpoint/2010/main" Requires="p14">
+  <mc:AlternateContent xmlns:mc="http://schemas.openxmlformats.org/markup-compatibility/2006" xmlns:p14="http://schemas.microsoft.com/office/powerpoint/2010/main">
+    <mc:Choice Requires="p14">
       <p:transition spd="med" p14:dur="700">
         <p:fade/>
       </p:transition>
     </mc:Choice>
-    <mc:Fallback>
+    <mc:Fallback xmlns="">
       <p:transition spd="med">
         <p:fade/>
       </p:transition>
@@ -4806,7 +4806,6 @@
               <a:rPr lang="bs-Latn-BA" sz="2200" dirty="0" smtClean="0"/>
               <a:t> statement withing JSX</a:t>
             </a:r>
-            <a:endParaRPr lang="bs-Latn-BA" sz="2200" dirty="0" smtClean="0"/>
           </a:p>
         </p:txBody>
       </p:sp>
@@ -4820,7 +4819,7 @@
         </p:nvSpPr>
         <p:spPr>
           <a:xfrm>
-            <a:off x="342900" y="2724150"/>
+            <a:off x="518160" y="2712720"/>
             <a:ext cx="8229600" cy="1200150"/>
           </a:xfrm>
           <a:prstGeom prst="rect">
@@ -4859,7 +4858,7 @@
           </a:lstStyle>
           <a:p>
             <a:r>
-              <a:rPr lang="bs-Latn-BA" sz="4800" dirty="0" smtClean="0"/>
+              <a:rPr lang="bs-Latn-BA" sz="4800" dirty="0"/>
               <a:t>That brings us to...</a:t>
             </a:r>
             <a:endParaRPr lang="en-US" sz="4800" dirty="0"/>
@@ -4876,13 +4875,13 @@
   <p:clrMapOvr>
     <a:masterClrMapping/>
   </p:clrMapOvr>
-  <mc:AlternateContent xmlns:mc="http://schemas.openxmlformats.org/markup-compatibility/2006">
-    <mc:Choice xmlns:p14="http://schemas.microsoft.com/office/powerpoint/2010/main" Requires="p14">
+  <mc:AlternateContent xmlns:mc="http://schemas.openxmlformats.org/markup-compatibility/2006" xmlns:p14="http://schemas.microsoft.com/office/powerpoint/2010/main">
+    <mc:Choice Requires="p14">
       <p:transition spd="med" p14:dur="700">
         <p:fade/>
       </p:transition>
     </mc:Choice>
-    <mc:Fallback>
+    <mc:Fallback xmlns="">
       <p:transition spd="med">
         <p:fade/>
       </p:transition>
@@ -5224,13 +5223,13 @@
   <p:clrMapOvr>
     <a:masterClrMapping/>
   </p:clrMapOvr>
-  <mc:AlternateContent xmlns:mc="http://schemas.openxmlformats.org/markup-compatibility/2006">
-    <mc:Choice xmlns:p14="http://schemas.microsoft.com/office/powerpoint/2010/main" Requires="p14">
+  <mc:AlternateContent xmlns:mc="http://schemas.openxmlformats.org/markup-compatibility/2006" xmlns:p14="http://schemas.microsoft.com/office/powerpoint/2010/main">
+    <mc:Choice Requires="p14">
       <p:transition spd="med" p14:dur="700">
         <p:fade/>
       </p:transition>
     </mc:Choice>
-    <mc:Fallback>
+    <mc:Fallback xmlns="">
       <p:transition spd="med">
         <p:fade/>
       </p:transition>
@@ -5352,13 +5351,13 @@
   <p:clrMapOvr>
     <a:masterClrMapping/>
   </p:clrMapOvr>
-  <mc:AlternateContent xmlns:mc="http://schemas.openxmlformats.org/markup-compatibility/2006">
-    <mc:Choice xmlns:p14="http://schemas.microsoft.com/office/powerpoint/2010/main" Requires="p14">
+  <mc:AlternateContent xmlns:mc="http://schemas.openxmlformats.org/markup-compatibility/2006" xmlns:p14="http://schemas.microsoft.com/office/powerpoint/2010/main">
+    <mc:Choice Requires="p14">
       <p:transition spd="med" p14:dur="700">
         <p:fade/>
       </p:transition>
     </mc:Choice>
-    <mc:Fallback>
+    <mc:Fallback xmlns="">
       <p:transition spd="med">
         <p:fade/>
       </p:transition>
@@ -5542,8 +5541,12 @@
               <a:buNone/>
             </a:pPr>
             <a:r>
+              <a:rPr lang="en-US" sz="2200" b="1" dirty="0"/>
+              <a:t>Components</a:t>
+            </a:r>
+            <a:r>
               <a:rPr lang="en-US" sz="2200" dirty="0"/>
-              <a:t>Components let you split the UI into independent, reusable pieces, and think about each piece in isolation</a:t>
+              <a:t> let you split the UI into independent, reusable pieces, and think about each piece in isolation</a:t>
             </a:r>
             <a:r>
               <a:rPr lang="en-US" sz="2200" dirty="0" smtClean="0"/>
@@ -6072,13 +6075,13 @@
   <p:clrMapOvr>
     <a:masterClrMapping/>
   </p:clrMapOvr>
-  <mc:AlternateContent xmlns:mc="http://schemas.openxmlformats.org/markup-compatibility/2006">
-    <mc:Choice xmlns:p14="http://schemas.microsoft.com/office/powerpoint/2010/main" Requires="p14">
+  <mc:AlternateContent xmlns:mc="http://schemas.openxmlformats.org/markup-compatibility/2006" xmlns:p14="http://schemas.microsoft.com/office/powerpoint/2010/main">
+    <mc:Choice Requires="p14">
       <p:transition spd="med" p14:dur="700">
         <p:fade/>
       </p:transition>
     </mc:Choice>
-    <mc:Fallback>
+    <mc:Fallback xmlns="">
       <p:transition spd="med">
         <p:fade/>
       </p:transition>
@@ -6893,8 +6896,8 @@
         </p:nvSpPr>
         <p:spPr>
           <a:xfrm>
-            <a:off x="457200" y="1428750"/>
-            <a:ext cx="8229600" cy="2895600"/>
+            <a:off x="457200" y="1733550"/>
+            <a:ext cx="8229600" cy="2286000"/>
           </a:xfrm>
         </p:spPr>
         <p:txBody>
@@ -6982,13 +6985,13 @@
   <p:clrMapOvr>
     <a:masterClrMapping/>
   </p:clrMapOvr>
-  <mc:AlternateContent xmlns:mc="http://schemas.openxmlformats.org/markup-compatibility/2006">
-    <mc:Choice xmlns:p14="http://schemas.microsoft.com/office/powerpoint/2010/main" Requires="p14">
+  <mc:AlternateContent xmlns:mc="http://schemas.openxmlformats.org/markup-compatibility/2006" xmlns:p14="http://schemas.microsoft.com/office/powerpoint/2010/main">
+    <mc:Choice Requires="p14">
       <p:transition spd="med" p14:dur="700">
         <p:fade/>
       </p:transition>
     </mc:Choice>
-    <mc:Fallback>
+    <mc:Fallback xmlns="">
       <p:transition spd="med">
         <p:fade/>
       </p:transition>
@@ -7113,13 +7116,13 @@
   <p:clrMapOvr>
     <a:masterClrMapping/>
   </p:clrMapOvr>
-  <mc:AlternateContent xmlns:mc="http://schemas.openxmlformats.org/markup-compatibility/2006">
-    <mc:Choice xmlns:p14="http://schemas.microsoft.com/office/powerpoint/2010/main" Requires="p14">
+  <mc:AlternateContent xmlns:mc="http://schemas.openxmlformats.org/markup-compatibility/2006" xmlns:p14="http://schemas.microsoft.com/office/powerpoint/2010/main">
+    <mc:Choice Requires="p14">
       <p:transition spd="med" p14:dur="700">
         <p:fade/>
       </p:transition>
     </mc:Choice>
-    <mc:Fallback>
+    <mc:Fallback xmlns="">
       <p:transition spd="med">
         <p:fade/>
       </p:transition>
@@ -7386,13 +7389,13 @@
   <p:clrMapOvr>
     <a:masterClrMapping/>
   </p:clrMapOvr>
-  <mc:AlternateContent xmlns:mc="http://schemas.openxmlformats.org/markup-compatibility/2006">
-    <mc:Choice xmlns:p14="http://schemas.microsoft.com/office/powerpoint/2010/main" Requires="p14">
+  <mc:AlternateContent xmlns:mc="http://schemas.openxmlformats.org/markup-compatibility/2006" xmlns:p14="http://schemas.microsoft.com/office/powerpoint/2010/main">
+    <mc:Choice Requires="p14">
       <p:transition spd="med" p14:dur="700">
         <p:fade/>
       </p:transition>
     </mc:Choice>
-    <mc:Fallback>
+    <mc:Fallback xmlns="">
       <p:transition spd="med">
         <p:fade/>
       </p:transition>
@@ -7536,13 +7539,13 @@
   <p:clrMapOvr>
     <a:masterClrMapping/>
   </p:clrMapOvr>
-  <mc:AlternateContent xmlns:mc="http://schemas.openxmlformats.org/markup-compatibility/2006">
-    <mc:Choice xmlns:p14="http://schemas.microsoft.com/office/powerpoint/2010/main" Requires="p14">
+  <mc:AlternateContent xmlns:mc="http://schemas.openxmlformats.org/markup-compatibility/2006" xmlns:p14="http://schemas.microsoft.com/office/powerpoint/2010/main">
+    <mc:Choice Requires="p14">
       <p:transition spd="med" p14:dur="700">
         <p:fade/>
       </p:transition>
     </mc:Choice>
-    <mc:Fallback>
+    <mc:Fallback xmlns="">
       <p:transition spd="med">
         <p:fade/>
       </p:transition>
@@ -7626,7 +7629,15 @@
             </a:pPr>
             <a:r>
               <a:rPr lang="bs-Latn-BA" sz="2200" dirty="0" smtClean="0"/>
-              <a:t>Every  stateful component has a render function</a:t>
+              <a:t>Every </a:t>
+            </a:r>
+            <a:r>
+              <a:rPr lang="bs-Latn-BA" sz="2200" dirty="0" smtClean="0"/>
+              <a:t>stateful </a:t>
+            </a:r>
+            <a:r>
+              <a:rPr lang="bs-Latn-BA" sz="2200" dirty="0" smtClean="0"/>
+              <a:t>component has a render function</a:t>
             </a:r>
           </a:p>
           <a:p>
@@ -7677,11 +7688,7 @@
             </a:r>
             <a:r>
               <a:rPr lang="bs-Latn-BA" sz="2200" dirty="0" smtClean="0"/>
-              <a:t>those elements</a:t>
-            </a:r>
-            <a:r>
-              <a:rPr lang="bs-Latn-BA" sz="2200" dirty="0" smtClean="0"/>
-              <a:t> </a:t>
+              <a:t>those elements </a:t>
             </a:r>
             <a:r>
               <a:rPr lang="bs-Latn-BA" sz="2200" dirty="0"/>
@@ -7709,13 +7716,13 @@
   <p:clrMapOvr>
     <a:masterClrMapping/>
   </p:clrMapOvr>
-  <mc:AlternateContent xmlns:mc="http://schemas.openxmlformats.org/markup-compatibility/2006">
-    <mc:Choice xmlns:p14="http://schemas.microsoft.com/office/powerpoint/2010/main" Requires="p14">
+  <mc:AlternateContent xmlns:mc="http://schemas.openxmlformats.org/markup-compatibility/2006" xmlns:p14="http://schemas.microsoft.com/office/powerpoint/2010/main">
+    <mc:Choice Requires="p14">
       <p:transition spd="med" p14:dur="700">
         <p:fade/>
       </p:transition>
     </mc:Choice>
-    <mc:Fallback>
+    <mc:Fallback xmlns="">
       <p:transition spd="med">
         <p:fade/>
       </p:transition>
@@ -7839,13 +7846,13 @@
   <p:clrMapOvr>
     <a:masterClrMapping/>
   </p:clrMapOvr>
-  <mc:AlternateContent xmlns:mc="http://schemas.openxmlformats.org/markup-compatibility/2006">
-    <mc:Choice xmlns:p14="http://schemas.microsoft.com/office/powerpoint/2010/main" Requires="p14">
+  <mc:AlternateContent xmlns:mc="http://schemas.openxmlformats.org/markup-compatibility/2006" xmlns:p14="http://schemas.microsoft.com/office/powerpoint/2010/main">
+    <mc:Choice Requires="p14">
       <p:transition spd="med" p14:dur="700">
         <p:fade/>
       </p:transition>
     </mc:Choice>
-    <mc:Fallback>
+    <mc:Fallback xmlns="">
       <p:transition spd="med">
         <p:fade/>
       </p:transition>
@@ -7942,13 +7949,13 @@
   <p:clrMapOvr>
     <a:masterClrMapping/>
   </p:clrMapOvr>
-  <mc:AlternateContent xmlns:mc="http://schemas.openxmlformats.org/markup-compatibility/2006">
-    <mc:Choice xmlns:p14="http://schemas.microsoft.com/office/powerpoint/2010/main" Requires="p14">
+  <mc:AlternateContent xmlns:mc="http://schemas.openxmlformats.org/markup-compatibility/2006" xmlns:p14="http://schemas.microsoft.com/office/powerpoint/2010/main">
+    <mc:Choice Requires="p14">
       <p:transition spd="med" p14:dur="700">
         <p:fade/>
       </p:transition>
     </mc:Choice>
-    <mc:Fallback>
+    <mc:Fallback xmlns="">
       <p:transition spd="med">
         <p:fade/>
       </p:transition>
@@ -8048,13 +8055,13 @@
   <p:clrMapOvr>
     <a:masterClrMapping/>
   </p:clrMapOvr>
-  <mc:AlternateContent xmlns:mc="http://schemas.openxmlformats.org/markup-compatibility/2006">
-    <mc:Choice xmlns:p14="http://schemas.microsoft.com/office/powerpoint/2010/main" Requires="p14">
+  <mc:AlternateContent xmlns:mc="http://schemas.openxmlformats.org/markup-compatibility/2006" xmlns:p14="http://schemas.microsoft.com/office/powerpoint/2010/main">
+    <mc:Choice Requires="p14">
       <p:transition spd="med" p14:dur="700">
         <p:fade/>
       </p:transition>
     </mc:Choice>
-    <mc:Fallback>
+    <mc:Fallback xmlns="">
       <p:transition spd="med">
         <p:fade/>
       </p:transition>
@@ -8213,13 +8220,13 @@
   <p:clrMapOvr>
     <a:masterClrMapping/>
   </p:clrMapOvr>
-  <mc:AlternateContent xmlns:mc="http://schemas.openxmlformats.org/markup-compatibility/2006">
-    <mc:Choice xmlns:p14="http://schemas.microsoft.com/office/powerpoint/2010/main" Requires="p14">
+  <mc:AlternateContent xmlns:mc="http://schemas.openxmlformats.org/markup-compatibility/2006" xmlns:p14="http://schemas.microsoft.com/office/powerpoint/2010/main">
+    <mc:Choice Requires="p14">
       <p:transition spd="med" p14:dur="700">
         <p:fade/>
       </p:transition>
     </mc:Choice>
-    <mc:Fallback>
+    <mc:Fallback xmlns="">
       <p:transition spd="med">
         <p:fade/>
       </p:transition>
@@ -8314,13 +8321,13 @@
   <p:clrMapOvr>
     <a:masterClrMapping/>
   </p:clrMapOvr>
-  <mc:AlternateContent xmlns:mc="http://schemas.openxmlformats.org/markup-compatibility/2006">
-    <mc:Choice xmlns:p14="http://schemas.microsoft.com/office/powerpoint/2010/main" Requires="p14">
+  <mc:AlternateContent xmlns:mc="http://schemas.openxmlformats.org/markup-compatibility/2006" xmlns:p14="http://schemas.microsoft.com/office/powerpoint/2010/main">
+    <mc:Choice Requires="p14">
       <p:transition spd="med" p14:dur="700">
         <p:fade/>
       </p:transition>
     </mc:Choice>
-    <mc:Fallback>
+    <mc:Fallback xmlns="">
       <p:transition spd="med">
         <p:fade/>
       </p:transition>
@@ -8466,13 +8473,13 @@
   <p:clrMapOvr>
     <a:masterClrMapping/>
   </p:clrMapOvr>
-  <mc:AlternateContent xmlns:mc="http://schemas.openxmlformats.org/markup-compatibility/2006">
-    <mc:Choice xmlns:p14="http://schemas.microsoft.com/office/powerpoint/2010/main" Requires="p14">
+  <mc:AlternateContent xmlns:mc="http://schemas.openxmlformats.org/markup-compatibility/2006" xmlns:p14="http://schemas.microsoft.com/office/powerpoint/2010/main">
+    <mc:Choice Requires="p14">
       <p:transition spd="med" p14:dur="700">
         <p:fade/>
       </p:transition>
     </mc:Choice>
-    <mc:Fallback>
+    <mc:Fallback xmlns="">
       <p:transition spd="med">
         <p:fade/>
       </p:transition>
@@ -8651,8 +8658,8 @@
         </p:nvSpPr>
         <p:spPr>
           <a:xfrm>
-            <a:off x="457200" y="1352550"/>
-            <a:ext cx="8229600" cy="3394472"/>
+            <a:off x="457200" y="1657350"/>
+            <a:ext cx="8229600" cy="2743200"/>
           </a:xfrm>
         </p:spPr>
         <p:txBody>
@@ -8765,13 +8772,13 @@
   <p:clrMapOvr>
     <a:masterClrMapping/>
   </p:clrMapOvr>
-  <mc:AlternateContent xmlns:mc="http://schemas.openxmlformats.org/markup-compatibility/2006">
-    <mc:Choice xmlns:p14="http://schemas.microsoft.com/office/powerpoint/2010/main" Requires="p14">
+  <mc:AlternateContent xmlns:mc="http://schemas.openxmlformats.org/markup-compatibility/2006" xmlns:p14="http://schemas.microsoft.com/office/powerpoint/2010/main">
+    <mc:Choice Requires="p14">
       <p:transition spd="med" p14:dur="700">
         <p:fade/>
       </p:transition>
     </mc:Choice>
-    <mc:Fallback>
+    <mc:Fallback xmlns="">
       <p:transition spd="med">
         <p:fade/>
       </p:transition>
@@ -8942,7 +8949,7 @@
         <p:spPr>
           <a:xfrm>
             <a:off x="838200" y="590551"/>
-            <a:ext cx="7467600" cy="1676400"/>
+            <a:ext cx="7467600" cy="1371599"/>
           </a:xfrm>
         </p:spPr>
         <p:txBody>
@@ -8973,15 +8980,19 @@
             </a:pPr>
             <a:r>
               <a:rPr lang="en-US" sz="2200" dirty="0"/>
-              <a:t>We use </a:t>
-            </a:r>
-            <a:r>
-              <a:rPr lang="en-US" sz="2200" b="1" dirty="0"/>
-              <a:t>Props</a:t>
-            </a:r>
-            <a:r>
-              <a:rPr lang="en-US" sz="2200" dirty="0"/>
-              <a:t> to pass the data from parent component to a child component.</a:t>
+              <a:t>We use Props to pass </a:t>
+            </a:r>
+            <a:r>
+              <a:rPr lang="en-US" sz="2200" dirty="0" smtClean="0"/>
+              <a:t>data </a:t>
+            </a:r>
+            <a:r>
+              <a:rPr lang="bs-Latn-BA" sz="2200" dirty="0" smtClean="0"/>
+              <a:t>between components</a:t>
+            </a:r>
+            <a:r>
+              <a:rPr lang="en-US" sz="2200" dirty="0" smtClean="0"/>
+              <a:t>.</a:t>
             </a:r>
             <a:endParaRPr lang="en-US" sz="2200" dirty="0"/>
           </a:p>
@@ -9057,13 +9068,13 @@
   <p:clrMapOvr>
     <a:masterClrMapping/>
   </p:clrMapOvr>
-  <mc:AlternateContent xmlns:mc="http://schemas.openxmlformats.org/markup-compatibility/2006">
-    <mc:Choice xmlns:p14="http://schemas.microsoft.com/office/powerpoint/2010/main" Requires="p14">
+  <mc:AlternateContent xmlns:mc="http://schemas.openxmlformats.org/markup-compatibility/2006" xmlns:p14="http://schemas.microsoft.com/office/powerpoint/2010/main">
+    <mc:Choice Requires="p14">
       <p:transition spd="med" p14:dur="700">
         <p:fade/>
       </p:transition>
     </mc:Choice>
-    <mc:Fallback>
+    <mc:Fallback xmlns="">
       <p:transition spd="med">
         <p:fade/>
       </p:transition>
@@ -9226,11 +9237,7 @@
           <a:p>
             <a:r>
               <a:rPr lang="bs-Latn-BA" sz="4800" dirty="0" smtClean="0"/>
-              <a:t>Using </a:t>
-            </a:r>
-            <a:r>
-              <a:rPr lang="bs-Latn-BA" sz="4800" dirty="0" smtClean="0"/>
-              <a:t>props</a:t>
+              <a:t>Using props</a:t>
             </a:r>
             <a:endParaRPr lang="en-US" sz="4800" dirty="0"/>
           </a:p>
@@ -9698,13 +9705,13 @@
   <p:clrMapOvr>
     <a:masterClrMapping/>
   </p:clrMapOvr>
-  <mc:AlternateContent xmlns:mc="http://schemas.openxmlformats.org/markup-compatibility/2006">
-    <mc:Choice xmlns:p14="http://schemas.microsoft.com/office/powerpoint/2010/main" Requires="p14">
+  <mc:AlternateContent xmlns:mc="http://schemas.openxmlformats.org/markup-compatibility/2006" xmlns:p14="http://schemas.microsoft.com/office/powerpoint/2010/main">
+    <mc:Choice Requires="p14">
       <p:transition spd="med" p14:dur="700">
         <p:fade/>
       </p:transition>
     </mc:Choice>
-    <mc:Fallback>
+    <mc:Fallback xmlns="">
       <p:transition spd="med">
         <p:fade/>
       </p:transition>
@@ -9830,13 +9837,13 @@
   <p:clrMapOvr>
     <a:masterClrMapping/>
   </p:clrMapOvr>
-  <mc:AlternateContent xmlns:mc="http://schemas.openxmlformats.org/markup-compatibility/2006">
-    <mc:Choice xmlns:p14="http://schemas.microsoft.com/office/powerpoint/2010/main" Requires="p14">
+  <mc:AlternateContent xmlns:mc="http://schemas.openxmlformats.org/markup-compatibility/2006" xmlns:p14="http://schemas.microsoft.com/office/powerpoint/2010/main">
+    <mc:Choice Requires="p14">
       <p:transition spd="med" p14:dur="700">
         <p:fade/>
       </p:transition>
     </mc:Choice>
-    <mc:Fallback>
+    <mc:Fallback xmlns="">
       <p:transition spd="med">
         <p:fade/>
       </p:transition>
@@ -10106,13 +10113,13 @@
   <p:clrMapOvr>
     <a:masterClrMapping/>
   </p:clrMapOvr>
-  <mc:AlternateContent xmlns:mc="http://schemas.openxmlformats.org/markup-compatibility/2006">
-    <mc:Choice xmlns:p14="http://schemas.microsoft.com/office/powerpoint/2010/main" Requires="p14">
+  <mc:AlternateContent xmlns:mc="http://schemas.openxmlformats.org/markup-compatibility/2006" xmlns:p14="http://schemas.microsoft.com/office/powerpoint/2010/main">
+    <mc:Choice Requires="p14">
       <p:transition spd="med" p14:dur="700">
         <p:fade/>
       </p:transition>
     </mc:Choice>
-    <mc:Fallback>
+    <mc:Fallback xmlns="">
       <p:transition spd="med">
         <p:fade/>
       </p:transition>
@@ -10421,12 +10428,8 @@
               <a:buNone/>
             </a:pPr>
             <a:r>
-              <a:rPr lang="bs-Latn-BA" sz="2200" b="1" dirty="0" smtClean="0"/>
-              <a:t>States</a:t>
-            </a:r>
-            <a:r>
               <a:rPr lang="bs-Latn-BA" sz="2200" dirty="0" smtClean="0"/>
-              <a:t> can be used for simple things like button clicks to very complex user triggered events.</a:t>
+              <a:t>States can be used for simple things like button clicks to very complex user triggered events.</a:t>
             </a:r>
           </a:p>
           <a:p>
@@ -10441,11 +10444,11 @@
             </a:pPr>
             <a:r>
               <a:rPr lang="bs-Latn-BA" sz="2200" dirty="0" smtClean="0"/>
-              <a:t>Every time we change a </a:t>
+              <a:t>Every time we change a State</a:t>
             </a:r>
             <a:r>
               <a:rPr lang="bs-Latn-BA" sz="2200" b="1" dirty="0" smtClean="0"/>
-              <a:t>State </a:t>
+              <a:t> </a:t>
             </a:r>
             <a:r>
               <a:rPr lang="bs-Latn-BA" sz="2200" dirty="0" smtClean="0"/>
@@ -10476,13 +10479,13 @@
   <p:clrMapOvr>
     <a:masterClrMapping/>
   </p:clrMapOvr>
-  <mc:AlternateContent xmlns:mc="http://schemas.openxmlformats.org/markup-compatibility/2006">
-    <mc:Choice xmlns:p14="http://schemas.microsoft.com/office/powerpoint/2010/main" Requires="p14">
+  <mc:AlternateContent xmlns:mc="http://schemas.openxmlformats.org/markup-compatibility/2006" xmlns:p14="http://schemas.microsoft.com/office/powerpoint/2010/main">
+    <mc:Choice Requires="p14">
       <p:transition spd="med" p14:dur="700">
         <p:fade/>
       </p:transition>
     </mc:Choice>
-    <mc:Fallback>
+    <mc:Fallback xmlns="">
       <p:transition spd="med">
         <p:fade/>
       </p:transition>
@@ -10583,7 +10586,6 @@
               <a:rPr lang="bs-Latn-BA" sz="2200" dirty="0" smtClean="0"/>
               <a:t>We create a trigger for the state change</a:t>
             </a:r>
-            <a:endParaRPr lang="bs-Latn-BA" sz="2200" dirty="0" smtClean="0"/>
           </a:p>
           <a:p>
             <a:pPr>
@@ -10713,13 +10715,13 @@
   <p:clrMapOvr>
     <a:masterClrMapping/>
   </p:clrMapOvr>
-  <mc:AlternateContent xmlns:mc="http://schemas.openxmlformats.org/markup-compatibility/2006">
-    <mc:Choice xmlns:p14="http://schemas.microsoft.com/office/powerpoint/2010/main" Requires="p14">
+  <mc:AlternateContent xmlns:mc="http://schemas.openxmlformats.org/markup-compatibility/2006" xmlns:p14="http://schemas.microsoft.com/office/powerpoint/2010/main">
+    <mc:Choice Requires="p14">
       <p:transition spd="med" p14:dur="700">
         <p:fade/>
       </p:transition>
     </mc:Choice>
-    <mc:Fallback>
+    <mc:Fallback xmlns="">
       <p:transition spd="med">
         <p:fade/>
       </p:transition>
@@ -11404,13 +11406,13 @@
   <p:clrMapOvr>
     <a:masterClrMapping/>
   </p:clrMapOvr>
-  <mc:AlternateContent xmlns:mc="http://schemas.openxmlformats.org/markup-compatibility/2006">
-    <mc:Choice xmlns:p14="http://schemas.microsoft.com/office/powerpoint/2010/main" Requires="p14">
+  <mc:AlternateContent xmlns:mc="http://schemas.openxmlformats.org/markup-compatibility/2006" xmlns:p14="http://schemas.microsoft.com/office/powerpoint/2010/main">
+    <mc:Choice Requires="p14">
       <p:transition spd="med" p14:dur="700">
         <p:fade/>
       </p:transition>
     </mc:Choice>
-    <mc:Fallback>
+    <mc:Fallback xmlns="">
       <p:transition spd="med">
         <p:fade/>
       </p:transition>
@@ -11734,13 +11736,13 @@
   <p:clrMapOvr>
     <a:masterClrMapping/>
   </p:clrMapOvr>
-  <mc:AlternateContent xmlns:mc="http://schemas.openxmlformats.org/markup-compatibility/2006">
-    <mc:Choice xmlns:p14="http://schemas.microsoft.com/office/powerpoint/2010/main" Requires="p14">
+  <mc:AlternateContent xmlns:mc="http://schemas.openxmlformats.org/markup-compatibility/2006" xmlns:p14="http://schemas.microsoft.com/office/powerpoint/2010/main">
+    <mc:Choice Requires="p14">
       <p:transition spd="med" p14:dur="700">
         <p:fade/>
       </p:transition>
     </mc:Choice>
-    <mc:Fallback>
+    <mc:Fallback xmlns="">
       <p:transition spd="med">
         <p:fade/>
       </p:transition>
@@ -12192,18 +12194,7 @@
                 <a:ea typeface="Arial Unicode MS" pitchFamily="34" charset="-128"/>
                 <a:cs typeface="Arial Unicode MS" pitchFamily="34" charset="-128"/>
               </a:rPr>
-              <a:t> </a:t>
-            </a:r>
-            <a:r>
-              <a:rPr lang="bs-Latn-BA" dirty="0" smtClean="0">
-                <a:solidFill>
-                  <a:schemeClr val="bg1"/>
-                </a:solidFill>
-                <a:latin typeface="Bahnschrift" pitchFamily="34" charset="0"/>
-                <a:ea typeface="Arial Unicode MS" pitchFamily="34" charset="-128"/>
-                <a:cs typeface="Arial Unicode MS" pitchFamily="34" charset="-128"/>
-              </a:rPr>
-              <a:t>Form</a:t>
+              <a:t> Form</a:t>
             </a:r>
             <a:endParaRPr lang="en-US" dirty="0">
               <a:solidFill>
@@ -12226,13 +12217,13 @@
   <p:clrMapOvr>
     <a:masterClrMapping/>
   </p:clrMapOvr>
-  <mc:AlternateContent xmlns:mc="http://schemas.openxmlformats.org/markup-compatibility/2006">
-    <mc:Choice xmlns:p14="http://schemas.microsoft.com/office/powerpoint/2010/main" Requires="p14">
+  <mc:AlternateContent xmlns:mc="http://schemas.openxmlformats.org/markup-compatibility/2006" xmlns:p14="http://schemas.microsoft.com/office/powerpoint/2010/main">
+    <mc:Choice Requires="p14">
       <p:transition spd="med" p14:dur="700">
         <p:fade/>
       </p:transition>
     </mc:Choice>
-    <mc:Fallback>
+    <mc:Fallback xmlns="">
       <p:transition spd="med">
         <p:fade/>
       </p:transition>
@@ -12435,8 +12426,16 @@
               <a:t> </a:t>
             </a:r>
             <a:r>
+              <a:rPr lang="bs-Latn-BA" b="1" dirty="0" smtClean="0"/>
+              <a:t>M</a:t>
+            </a:r>
+            <a:r>
+              <a:rPr lang="en-US" b="1" dirty="0" err="1" smtClean="0"/>
+              <a:t>ethods</a:t>
+            </a:r>
+            <a:r>
               <a:rPr lang="en-US" dirty="0" smtClean="0"/>
-              <a:t>methods </a:t>
+              <a:t> </a:t>
             </a:r>
             <a:r>
               <a:rPr lang="en-US" dirty="0"/>
@@ -12456,15 +12455,15 @@
             </a:pPr>
             <a:r>
               <a:rPr lang="bs-Latn-BA" dirty="0" smtClean="0"/>
-              <a:t>Some of the many </a:t>
-            </a:r>
-            <a:r>
-              <a:rPr lang="bs-Latn-BA" b="1" dirty="0" smtClean="0"/>
-              <a:t>Lifecycle</a:t>
+              <a:t>Some of the many Lifecycle </a:t>
             </a:r>
             <a:r>
               <a:rPr lang="bs-Latn-BA" dirty="0" smtClean="0"/>
-              <a:t> methods in React:</a:t>
+              <a:t>Methods </a:t>
+            </a:r>
+            <a:r>
+              <a:rPr lang="bs-Latn-BA" dirty="0" smtClean="0"/>
+              <a:t>in React:</a:t>
             </a:r>
             <a:endParaRPr lang="bs-Latn-BA" dirty="0"/>
           </a:p>
@@ -12532,13 +12531,13 @@
   <p:clrMapOvr>
     <a:masterClrMapping/>
   </p:clrMapOvr>
-  <mc:AlternateContent xmlns:mc="http://schemas.openxmlformats.org/markup-compatibility/2006">
-    <mc:Choice xmlns:p14="http://schemas.microsoft.com/office/powerpoint/2010/main" Requires="p14">
+  <mc:AlternateContent xmlns:mc="http://schemas.openxmlformats.org/markup-compatibility/2006" xmlns:p14="http://schemas.microsoft.com/office/powerpoint/2010/main">
+    <mc:Choice Requires="p14">
       <p:transition spd="med" p14:dur="700">
         <p:fade/>
       </p:transition>
     </mc:Choice>
-    <mc:Fallback>
+    <mc:Fallback xmlns="">
       <p:transition spd="med">
         <p:fade/>
       </p:transition>
@@ -13435,13 +13434,13 @@
   <p:clrMapOvr>
     <a:masterClrMapping/>
   </p:clrMapOvr>
-  <mc:AlternateContent xmlns:mc="http://schemas.openxmlformats.org/markup-compatibility/2006">
-    <mc:Choice xmlns:p14="http://schemas.microsoft.com/office/powerpoint/2010/main" Requires="p14">
+  <mc:AlternateContent xmlns:mc="http://schemas.openxmlformats.org/markup-compatibility/2006" xmlns:p14="http://schemas.microsoft.com/office/powerpoint/2010/main">
+    <mc:Choice Requires="p14">
       <p:transition spd="med" p14:dur="700">
         <p:fade/>
       </p:transition>
     </mc:Choice>
-    <mc:Fallback>
+    <mc:Fallback xmlns="">
       <p:transition spd="med">
         <p:fade/>
       </p:transition>
@@ -13735,13 +13734,13 @@
   <p:clrMapOvr>
     <a:masterClrMapping/>
   </p:clrMapOvr>
-  <mc:AlternateContent xmlns:mc="http://schemas.openxmlformats.org/markup-compatibility/2006">
-    <mc:Choice xmlns:p14="http://schemas.microsoft.com/office/powerpoint/2010/main" Requires="p14">
+  <mc:AlternateContent xmlns:mc="http://schemas.openxmlformats.org/markup-compatibility/2006" xmlns:p14="http://schemas.microsoft.com/office/powerpoint/2010/main">
+    <mc:Choice Requires="p14">
       <p:transition spd="med" p14:dur="700">
         <p:fade/>
       </p:transition>
     </mc:Choice>
-    <mc:Fallback>
+    <mc:Fallback xmlns="">
       <p:transition spd="med">
         <p:fade/>
       </p:transition>
@@ -14133,13 +14132,13 @@
   <p:clrMapOvr>
     <a:masterClrMapping/>
   </p:clrMapOvr>
-  <mc:AlternateContent xmlns:mc="http://schemas.openxmlformats.org/markup-compatibility/2006">
-    <mc:Choice xmlns:p14="http://schemas.microsoft.com/office/powerpoint/2010/main" Requires="p14">
+  <mc:AlternateContent xmlns:mc="http://schemas.openxmlformats.org/markup-compatibility/2006" xmlns:p14="http://schemas.microsoft.com/office/powerpoint/2010/main">
+    <mc:Choice Requires="p14">
       <p:transition spd="med" p14:dur="700">
         <p:fade/>
       </p:transition>
     </mc:Choice>
-    <mc:Fallback>
+    <mc:Fallback xmlns="">
       <p:transition spd="med">
         <p:fade/>
       </p:transition>
@@ -15311,13 +15310,13 @@
   <p:clrMapOvr>
     <a:masterClrMapping/>
   </p:clrMapOvr>
-  <mc:AlternateContent xmlns:mc="http://schemas.openxmlformats.org/markup-compatibility/2006">
-    <mc:Choice xmlns:p14="http://schemas.microsoft.com/office/powerpoint/2010/main" Requires="p14">
+  <mc:AlternateContent xmlns:mc="http://schemas.openxmlformats.org/markup-compatibility/2006" xmlns:p14="http://schemas.microsoft.com/office/powerpoint/2010/main">
+    <mc:Choice Requires="p14">
       <p:transition spd="med" p14:dur="700">
         <p:fade/>
       </p:transition>
     </mc:Choice>
-    <mc:Fallback>
+    <mc:Fallback xmlns="">
       <p:transition spd="med">
         <p:fade/>
       </p:transition>
@@ -15556,7 +15555,11 @@
             </a:pPr>
             <a:r>
               <a:rPr lang="bs-Latn-BA" sz="2200" dirty="0" smtClean="0"/>
-              <a:t>- Lifecycle methods</a:t>
+              <a:t>- Lifecycle </a:t>
+            </a:r>
+            <a:r>
+              <a:rPr lang="bs-Latn-BA" sz="2200" dirty="0" smtClean="0"/>
+              <a:t>Methods</a:t>
             </a:r>
             <a:endParaRPr lang="en-US" sz="2200" dirty="0"/>
           </a:p>
@@ -15602,13 +15605,13 @@
   <p:clrMapOvr>
     <a:masterClrMapping/>
   </p:clrMapOvr>
-  <mc:AlternateContent xmlns:mc="http://schemas.openxmlformats.org/markup-compatibility/2006">
-    <mc:Choice xmlns:p14="http://schemas.microsoft.com/office/powerpoint/2010/main" Requires="p14">
+  <mc:AlternateContent xmlns:mc="http://schemas.openxmlformats.org/markup-compatibility/2006" xmlns:p14="http://schemas.microsoft.com/office/powerpoint/2010/main">
+    <mc:Choice Requires="p14">
       <p:transition spd="med" p14:dur="700">
         <p:fade/>
       </p:transition>
     </mc:Choice>
-    <mc:Fallback>
+    <mc:Fallback xmlns="">
       <p:transition spd="med">
         <p:fade/>
       </p:transition>
@@ -15931,13 +15934,13 @@
   <p:clrMapOvr>
     <a:masterClrMapping/>
   </p:clrMapOvr>
-  <mc:AlternateContent xmlns:mc="http://schemas.openxmlformats.org/markup-compatibility/2006">
-    <mc:Choice xmlns:p14="http://schemas.microsoft.com/office/powerpoint/2010/main" Requires="p14">
+  <mc:AlternateContent xmlns:mc="http://schemas.openxmlformats.org/markup-compatibility/2006" xmlns:p14="http://schemas.microsoft.com/office/powerpoint/2010/main">
+    <mc:Choice Requires="p14">
       <p:transition spd="med" p14:dur="700">
         <p:fade/>
       </p:transition>
     </mc:Choice>
-    <mc:Fallback>
+    <mc:Fallback xmlns="">
       <p:transition spd="med">
         <p:fade/>
       </p:transition>
@@ -16157,13 +16160,13 @@
   <p:clrMapOvr>
     <a:masterClrMapping/>
   </p:clrMapOvr>
-  <mc:AlternateContent xmlns:mc="http://schemas.openxmlformats.org/markup-compatibility/2006">
-    <mc:Choice xmlns:p14="http://schemas.microsoft.com/office/powerpoint/2010/main" Requires="p14">
+  <mc:AlternateContent xmlns:mc="http://schemas.openxmlformats.org/markup-compatibility/2006" xmlns:p14="http://schemas.microsoft.com/office/powerpoint/2010/main">
+    <mc:Choice Requires="p14">
       <p:transition spd="med" p14:dur="700">
         <p:fade/>
       </p:transition>
     </mc:Choice>
-    <mc:Fallback>
+    <mc:Fallback xmlns="">
       <p:transition spd="med">
         <p:fade/>
       </p:transition>
@@ -16213,7 +16216,11 @@
           <a:p>
             <a:r>
               <a:rPr lang="bs-Latn-BA" sz="4800" dirty="0" smtClean="0"/>
-              <a:t>Don‘t do this</a:t>
+              <a:t>Don‘t </a:t>
+            </a:r>
+            <a:r>
+              <a:rPr lang="bs-Latn-BA" sz="4800" dirty="0" smtClean="0"/>
+              <a:t>try this</a:t>
             </a:r>
             <a:endParaRPr lang="en-US" sz="4800" dirty="0"/>
           </a:p>
@@ -16334,13 +16341,13 @@
   <p:clrMapOvr>
     <a:masterClrMapping/>
   </p:clrMapOvr>
-  <mc:AlternateContent xmlns:mc="http://schemas.openxmlformats.org/markup-compatibility/2006">
-    <mc:Choice xmlns:p14="http://schemas.microsoft.com/office/powerpoint/2010/main" Requires="p14">
+  <mc:AlternateContent xmlns:mc="http://schemas.openxmlformats.org/markup-compatibility/2006" xmlns:p14="http://schemas.microsoft.com/office/powerpoint/2010/main">
+    <mc:Choice Requires="p14">
       <p:transition spd="med" p14:dur="700">
         <p:fade/>
       </p:transition>
     </mc:Choice>
-    <mc:Fallback>
+    <mc:Fallback xmlns="">
       <p:transition spd="med">
         <p:fade/>
       </p:transition>
@@ -16517,7 +16524,7 @@
         </p:nvSpPr>
         <p:spPr>
           <a:xfrm>
-            <a:off x="5486400" y="1581150"/>
+            <a:off x="6019800" y="1581150"/>
             <a:ext cx="2431474" cy="762000"/>
           </a:xfrm>
           <a:prstGeom prst="rect">
@@ -16702,8 +16709,28 @@
                   <a:schemeClr val="bg1"/>
                 </a:solidFill>
               </a:rPr>
-              <a:t>Before destructuring:</a:t>
-            </a:r>
+              <a:t>Before</a:t>
+            </a:r>
+            <a:br>
+              <a:rPr lang="bs-Latn-BA" sz="1800" dirty="0" smtClean="0">
+                <a:solidFill>
+                  <a:schemeClr val="bg1"/>
+                </a:solidFill>
+              </a:rPr>
+            </a:br>
+            <a:r>
+              <a:rPr lang="bs-Latn-BA" sz="1800" dirty="0" smtClean="0">
+                <a:solidFill>
+                  <a:schemeClr val="bg1"/>
+                </a:solidFill>
+              </a:rPr>
+              <a:t>destructuring</a:t>
+            </a:r>
+            <a:endParaRPr lang="bs-Latn-BA" sz="1800" dirty="0" smtClean="0">
+              <a:solidFill>
+                <a:schemeClr val="bg1"/>
+              </a:solidFill>
+            </a:endParaRPr>
           </a:p>
         </p:txBody>
       </p:sp>
@@ -16729,7 +16756,7 @@
         </p:blipFill>
         <p:spPr>
           <a:xfrm>
-            <a:off x="914400" y="1200150"/>
+            <a:off x="822960" y="1192237"/>
             <a:ext cx="7391400" cy="3412183"/>
           </a:xfrm>
           <a:prstGeom prst="rect">
@@ -17037,8 +17064,13 @@
                   <a:schemeClr val="bg1"/>
                 </a:solidFill>
               </a:rPr>
-              <a:t>destructuring:</a:t>
-            </a:r>
+              <a:t>destructuring</a:t>
+            </a:r>
+            <a:endParaRPr lang="bs-Latn-BA" sz="1800" dirty="0" smtClean="0">
+              <a:solidFill>
+                <a:schemeClr val="bg1"/>
+              </a:solidFill>
+            </a:endParaRPr>
           </a:p>
         </p:txBody>
       </p:sp>
@@ -17064,7 +17096,7 @@
         </p:blipFill>
         <p:spPr>
           <a:xfrm>
-            <a:off x="914400" y="1199567"/>
+            <a:off x="822960" y="1192237"/>
             <a:ext cx="7391400" cy="3412766"/>
           </a:xfrm>
           <a:prstGeom prst="rect">
@@ -17080,8 +17112,8 @@
         </p:nvSpPr>
         <p:spPr>
           <a:xfrm>
-            <a:off x="1356360" y="1580567"/>
-            <a:ext cx="4267200" cy="381000"/>
+            <a:off x="1219200" y="1580567"/>
+            <a:ext cx="4404360" cy="381000"/>
           </a:xfrm>
           <a:prstGeom prst="roundRect">
             <a:avLst/>
@@ -17328,13 +17360,13 @@
   <p:clrMapOvr>
     <a:masterClrMapping/>
   </p:clrMapOvr>
-  <mc:AlternateContent xmlns:mc="http://schemas.openxmlformats.org/markup-compatibility/2006">
-    <mc:Choice xmlns:p14="http://schemas.microsoft.com/office/powerpoint/2010/main" Requires="p14">
+  <mc:AlternateContent xmlns:mc="http://schemas.openxmlformats.org/markup-compatibility/2006" xmlns:p14="http://schemas.microsoft.com/office/powerpoint/2010/main">
+    <mc:Choice Requires="p14">
       <p:transition spd="med" p14:dur="700">
         <p:fade/>
       </p:transition>
     </mc:Choice>
-    <mc:Fallback>
+    <mc:Fallback xmlns="">
       <p:transition spd="med">
         <p:fade/>
       </p:transition>
@@ -18283,8 +18315,21 @@
                   <a:schemeClr val="bg1"/>
                 </a:solidFill>
               </a:rPr>
-              <a:t>Implementing option two, we get the following result:</a:t>
-            </a:r>
+              <a:t>Implementing option two, we get the following </a:t>
+            </a:r>
+            <a:r>
+              <a:rPr lang="bs-Latn-BA" sz="1800" dirty="0" smtClean="0">
+                <a:solidFill>
+                  <a:schemeClr val="bg1"/>
+                </a:solidFill>
+              </a:rPr>
+              <a:t>result</a:t>
+            </a:r>
+            <a:endParaRPr lang="bs-Latn-BA" sz="1800" dirty="0" smtClean="0">
+              <a:solidFill>
+                <a:schemeClr val="bg1"/>
+              </a:solidFill>
+            </a:endParaRPr>
           </a:p>
         </p:txBody>
       </p:sp>
@@ -18298,13 +18343,13 @@
   <p:clrMapOvr>
     <a:masterClrMapping/>
   </p:clrMapOvr>
-  <mc:AlternateContent xmlns:mc="http://schemas.openxmlformats.org/markup-compatibility/2006">
-    <mc:Choice xmlns:p14="http://schemas.microsoft.com/office/powerpoint/2010/main" Requires="p14">
+  <mc:AlternateContent xmlns:mc="http://schemas.openxmlformats.org/markup-compatibility/2006" xmlns:p14="http://schemas.microsoft.com/office/powerpoint/2010/main">
+    <mc:Choice Requires="p14">
       <p:transition spd="med" p14:dur="700">
         <p:fade/>
       </p:transition>
     </mc:Choice>
-    <mc:Fallback>
+    <mc:Fallback xmlns="">
       <p:transition spd="med">
         <p:fade/>
       </p:transition>
@@ -18722,7 +18767,7 @@
         <p:spPr bwMode="auto">
           <a:xfrm>
             <a:off x="1752600" y="866"/>
-            <a:ext cx="5257800" cy="5145232"/>
+            <a:ext cx="5334000" cy="5145232"/>
           </a:xfrm>
           <a:prstGeom prst="rect">
             <a:avLst/>
@@ -18749,13 +18794,13 @@
   <p:clrMapOvr>
     <a:masterClrMapping/>
   </p:clrMapOvr>
-  <mc:AlternateContent xmlns:mc="http://schemas.openxmlformats.org/markup-compatibility/2006">
-    <mc:Choice xmlns:p14="http://schemas.microsoft.com/office/powerpoint/2010/main" Requires="p14">
+  <mc:AlternateContent xmlns:mc="http://schemas.openxmlformats.org/markup-compatibility/2006" xmlns:p14="http://schemas.microsoft.com/office/powerpoint/2010/main">
+    <mc:Choice Requires="p14">
       <p:transition spd="med" p14:dur="700">
         <p:fade/>
       </p:transition>
     </mc:Choice>
-    <mc:Fallback>
+    <mc:Fallback xmlns="">
       <p:transition spd="med">
         <p:fade/>
       </p:transition>
@@ -19007,13 +19052,13 @@
   <p:clrMapOvr>
     <a:masterClrMapping/>
   </p:clrMapOvr>
-  <mc:AlternateContent xmlns:mc="http://schemas.openxmlformats.org/markup-compatibility/2006">
-    <mc:Choice xmlns:p14="http://schemas.microsoft.com/office/powerpoint/2010/main" Requires="p14">
+  <mc:AlternateContent xmlns:mc="http://schemas.openxmlformats.org/markup-compatibility/2006" xmlns:p14="http://schemas.microsoft.com/office/powerpoint/2010/main">
+    <mc:Choice Requires="p14">
       <p:transition spd="med" p14:dur="700">
         <p:fade/>
       </p:transition>
     </mc:Choice>
-    <mc:Fallback>
+    <mc:Fallback xmlns="">
       <p:transition spd="med">
         <p:fade/>
       </p:transition>
@@ -19323,8 +19368,12 @@
               <a:buChar char="-"/>
             </a:pPr>
             <a:r>
+              <a:rPr lang="bs-Latn-BA" sz="2200" b="1" dirty="0" smtClean="0"/>
+              <a:t>React Router</a:t>
+            </a:r>
+            <a:r>
               <a:rPr lang="bs-Latn-BA" sz="2200" dirty="0" smtClean="0"/>
-              <a:t>React Router (single page apps)</a:t>
+              <a:t> (single page apps)</a:t>
             </a:r>
           </a:p>
           <a:p>
@@ -19333,16 +19382,12 @@
               <a:buChar char="-"/>
             </a:pPr>
             <a:r>
+              <a:rPr lang="bs-Latn-BA" sz="2200" b="1" dirty="0" smtClean="0"/>
+              <a:t>Firebase</a:t>
+            </a:r>
+            <a:r>
               <a:rPr lang="bs-Latn-BA" sz="2200" dirty="0" smtClean="0"/>
-              <a:t>Firebase </a:t>
-            </a:r>
-            <a:r>
-              <a:rPr lang="bs-Latn-BA" sz="2200" dirty="0" smtClean="0"/>
-              <a:t>(database </a:t>
-            </a:r>
-            <a:r>
-              <a:rPr lang="bs-Latn-BA" sz="2200" dirty="0" smtClean="0"/>
-              <a:t>as a service)</a:t>
+              <a:t> (database as a service)</a:t>
             </a:r>
           </a:p>
           <a:p>
@@ -19351,7 +19396,7 @@
               <a:buChar char="-"/>
             </a:pPr>
             <a:r>
-              <a:rPr lang="bs-Latn-BA" sz="2200" dirty="0"/>
+              <a:rPr lang="bs-Latn-BA" sz="2200" b="1" dirty="0"/>
               <a:t>React Flow </a:t>
             </a:r>
             <a:r>
@@ -19373,8 +19418,20 @@
               <a:buChar char="-"/>
             </a:pPr>
             <a:r>
+              <a:rPr lang="bs-Latn-BA" sz="2200" b="1" dirty="0"/>
+              <a:t>React Suspense</a:t>
+            </a:r>
+            <a:r>
               <a:rPr lang="bs-Latn-BA" sz="2200" dirty="0"/>
-              <a:t>React Suspense and Lazy (split code into bundles</a:t>
+              <a:t> and </a:t>
+            </a:r>
+            <a:r>
+              <a:rPr lang="bs-Latn-BA" sz="2200" b="1" dirty="0"/>
+              <a:t>Lazy</a:t>
+            </a:r>
+            <a:r>
+              <a:rPr lang="bs-Latn-BA" sz="2200" dirty="0"/>
+              <a:t> (split code into bundles</a:t>
             </a:r>
             <a:r>
               <a:rPr lang="bs-Latn-BA" sz="2200" dirty="0" smtClean="0"/>
@@ -19387,16 +19444,12 @@
               <a:buChar char="-"/>
             </a:pPr>
             <a:r>
+              <a:rPr lang="bs-Latn-BA" sz="2200" b="1" dirty="0" smtClean="0"/>
+              <a:t>Context API</a:t>
+            </a:r>
+            <a:r>
               <a:rPr lang="bs-Latn-BA" sz="2200" dirty="0" smtClean="0"/>
-              <a:t>Context API </a:t>
-            </a:r>
-            <a:r>
-              <a:rPr lang="bs-Latn-BA" sz="2200" dirty="0" smtClean="0"/>
-              <a:t>(easier </a:t>
-            </a:r>
-            <a:r>
-              <a:rPr lang="bs-Latn-BA" sz="2200" dirty="0" smtClean="0"/>
-              <a:t>state management)</a:t>
+              <a:t> (easier state management)</a:t>
             </a:r>
           </a:p>
           <a:p>
@@ -19405,17 +19458,34 @@
               <a:buChar char="-"/>
             </a:pPr>
             <a:r>
+              <a:rPr lang="bs-Latn-BA" sz="2200" b="1" dirty="0" smtClean="0"/>
+              <a:t>Redux</a:t>
+            </a:r>
+            <a:r>
               <a:rPr lang="bs-Latn-BA" sz="2200" dirty="0" smtClean="0"/>
-              <a:t>Redux, MobX and Flux </a:t>
+              <a:t>, </a:t>
+            </a:r>
+            <a:r>
+              <a:rPr lang="bs-Latn-BA" sz="2200" b="1" dirty="0" smtClean="0"/>
+              <a:t>MobX</a:t>
             </a:r>
             <a:r>
               <a:rPr lang="bs-Latn-BA" sz="2200" dirty="0" smtClean="0"/>
-              <a:t>(libraries </a:t>
+              <a:t> and </a:t>
+            </a:r>
+            <a:r>
+              <a:rPr lang="bs-Latn-BA" sz="2200" b="1" dirty="0" smtClean="0"/>
+              <a:t>Flux</a:t>
             </a:r>
             <a:r>
               <a:rPr lang="bs-Latn-BA" sz="2200" dirty="0" smtClean="0"/>
-              <a:t>for state management)</a:t>
-            </a:r>
+              <a:t> (libraries for state management</a:t>
+            </a:r>
+            <a:r>
+              <a:rPr lang="bs-Latn-BA" sz="2200" dirty="0" smtClean="0"/>
+              <a:t>)</a:t>
+            </a:r>
+            <a:endParaRPr lang="bs-Latn-BA" sz="2200" dirty="0" smtClean="0"/>
           </a:p>
           <a:p>
             <a:pPr>
@@ -19423,16 +19493,30 @@
               <a:buChar char="-"/>
             </a:pPr>
             <a:r>
+              <a:rPr lang="bs-Latn-BA" sz="2200" b="1" dirty="0" smtClean="0"/>
+              <a:t>React Hooks</a:t>
+            </a:r>
+            <a:r>
               <a:rPr lang="bs-Latn-BA" sz="2200" dirty="0" smtClean="0"/>
-              <a:t>React Hooks </a:t>
+              <a:t> (write components without a class</a:t>
             </a:r>
             <a:r>
               <a:rPr lang="bs-Latn-BA" sz="2200" dirty="0" smtClean="0"/>
-              <a:t>(write </a:t>
+              <a:t>)</a:t>
+            </a:r>
+          </a:p>
+          <a:p>
+            <a:pPr>
+              <a:buFontTx/>
+              <a:buChar char="-"/>
+            </a:pPr>
+            <a:r>
+              <a:rPr lang="bs-Latn-BA" sz="2200" b="1" dirty="0" smtClean="0"/>
+              <a:t>React Native</a:t>
             </a:r>
             <a:r>
               <a:rPr lang="bs-Latn-BA" sz="2200" dirty="0" smtClean="0"/>
-              <a:t>components without a class)</a:t>
+              <a:t> (build native mobile apps)</a:t>
             </a:r>
             <a:endParaRPr lang="bs-Latn-BA" sz="2200" dirty="0"/>
           </a:p>
@@ -19448,13 +19532,13 @@
   <p:clrMapOvr>
     <a:masterClrMapping/>
   </p:clrMapOvr>
-  <mc:AlternateContent xmlns:mc="http://schemas.openxmlformats.org/markup-compatibility/2006">
-    <mc:Choice xmlns:p14="http://schemas.microsoft.com/office/powerpoint/2010/main" Requires="p14">
+  <mc:AlternateContent xmlns:mc="http://schemas.openxmlformats.org/markup-compatibility/2006" xmlns:p14="http://schemas.microsoft.com/office/powerpoint/2010/main">
+    <mc:Choice Requires="p14">
       <p:transition spd="med" p14:dur="700">
         <p:fade/>
       </p:transition>
     </mc:Choice>
-    <mc:Fallback>
+    <mc:Fallback xmlns="">
       <p:transition spd="med">
         <p:fade/>
       </p:transition>
@@ -19532,8 +19616,12 @@
               <a:buChar char="•"/>
             </a:pPr>
             <a:r>
+              <a:rPr lang="bs-Latn-BA" sz="2200" b="1" dirty="0" smtClean="0"/>
+              <a:t>Udemy</a:t>
+            </a:r>
+            <a:r>
               <a:rPr lang="bs-Latn-BA" sz="2200" dirty="0" smtClean="0"/>
-              <a:t>Udemy</a:t>
+              <a:t/>
             </a:r>
             <a:br>
               <a:rPr lang="bs-Latn-BA" sz="2200" dirty="0" smtClean="0"/>
@@ -19563,8 +19651,12 @@
               <a:buChar char="•"/>
             </a:pPr>
             <a:r>
+              <a:rPr lang="bs-Latn-BA" sz="2200" b="1" dirty="0" smtClean="0"/>
+              <a:t>Youtube</a:t>
+            </a:r>
+            <a:r>
               <a:rPr lang="bs-Latn-BA" sz="2200" dirty="0" smtClean="0"/>
-              <a:t>Youtube</a:t>
+              <a:t/>
             </a:r>
             <a:br>
               <a:rPr lang="bs-Latn-BA" sz="2200" dirty="0" smtClean="0"/>
@@ -19602,8 +19694,12 @@
               <a:buChar char="•"/>
             </a:pPr>
             <a:r>
+              <a:rPr lang="bs-Latn-BA" sz="2200" b="1" dirty="0" smtClean="0"/>
+              <a:t>ReactJS Docs</a:t>
+            </a:r>
+            <a:r>
               <a:rPr lang="bs-Latn-BA" sz="2200" dirty="0" smtClean="0"/>
-              <a:t>ReactJS Docs</a:t>
+              <a:t/>
             </a:r>
             <a:br>
               <a:rPr lang="bs-Latn-BA" sz="2200" dirty="0" smtClean="0"/>
@@ -19612,13 +19708,7 @@
               <a:rPr lang="bs-Latn-BA" sz="2200" dirty="0" smtClean="0">
                 <a:hlinkClick r:id="rId2"/>
               </a:rPr>
-              <a:t>https://</a:t>
-            </a:r>
-            <a:r>
-              <a:rPr lang="bs-Latn-BA" sz="2200" dirty="0" smtClean="0">
-                <a:hlinkClick r:id="rId2"/>
-              </a:rPr>
-              <a:t>reactjs.org/docs/getting-started.html</a:t>
+              <a:t>https://reactjs.org/docs/getting-started.html</a:t>
             </a:r>
             <a:endParaRPr lang="bs-Latn-BA" sz="2200" dirty="0" smtClean="0"/>
           </a:p>
@@ -19646,13 +19736,13 @@
   <p:clrMapOvr>
     <a:masterClrMapping/>
   </p:clrMapOvr>
-  <mc:AlternateContent xmlns:mc="http://schemas.openxmlformats.org/markup-compatibility/2006">
-    <mc:Choice xmlns:p14="http://schemas.microsoft.com/office/powerpoint/2010/main" Requires="p14">
+  <mc:AlternateContent xmlns:mc="http://schemas.openxmlformats.org/markup-compatibility/2006" xmlns:p14="http://schemas.microsoft.com/office/powerpoint/2010/main">
+    <mc:Choice Requires="p14">
       <p:transition spd="med" p14:dur="700">
         <p:fade/>
       </p:transition>
     </mc:Choice>
-    <mc:Fallback>
+    <mc:Fallback xmlns="">
       <p:transition spd="med">
         <p:fade/>
       </p:transition>
@@ -19718,7 +19808,12 @@
             <p:ph idx="1"/>
           </p:nvPr>
         </p:nvSpPr>
-        <p:spPr/>
+        <p:spPr>
+          <a:xfrm>
+            <a:off x="457200" y="1504950"/>
+            <a:ext cx="8229600" cy="3047999"/>
+          </a:xfrm>
+        </p:spPr>
         <p:txBody>
           <a:bodyPr>
             <a:normAutofit/>
@@ -19730,9 +19825,14 @@
               <a:buChar char="•"/>
             </a:pPr>
             <a:r>
-              <a:rPr lang="bs-Latn-BA" sz="2200" dirty="0" smtClean="0"/>
-              <a:t>Presentation and demos:</a:t>
-            </a:r>
+              <a:rPr lang="bs-Latn-BA" sz="2200" b="1" dirty="0" smtClean="0"/>
+              <a:t>Presentation and </a:t>
+            </a:r>
+            <a:r>
+              <a:rPr lang="bs-Latn-BA" sz="2200" b="1" dirty="0" smtClean="0"/>
+              <a:t>demos</a:t>
+            </a:r>
+            <a:endParaRPr lang="bs-Latn-BA" sz="2200" dirty="0" smtClean="0"/>
           </a:p>
           <a:p>
             <a:pPr marL="0" indent="0">
@@ -19764,7 +19864,7 @@
               <a:buChar char="•"/>
             </a:pPr>
             <a:r>
-              <a:rPr lang="bs-Latn-BA" sz="2200" dirty="0" smtClean="0"/>
+              <a:rPr lang="bs-Latn-BA" sz="2200" b="1" dirty="0" smtClean="0"/>
               <a:t>Contact</a:t>
             </a:r>
           </a:p>
@@ -19829,13 +19929,13 @@
   <p:clrMapOvr>
     <a:masterClrMapping/>
   </p:clrMapOvr>
-  <mc:AlternateContent xmlns:mc="http://schemas.openxmlformats.org/markup-compatibility/2006">
-    <mc:Choice xmlns:p14="http://schemas.microsoft.com/office/powerpoint/2010/main" Requires="p14">
+  <mc:AlternateContent xmlns:mc="http://schemas.openxmlformats.org/markup-compatibility/2006" xmlns:p14="http://schemas.microsoft.com/office/powerpoint/2010/main">
+    <mc:Choice Requires="p14">
       <p:transition spd="med" p14:dur="700">
         <p:fade/>
       </p:transition>
     </mc:Choice>
-    <mc:Fallback>
+    <mc:Fallback xmlns="">
       <p:transition spd="med">
         <p:fade/>
       </p:transition>
@@ -19907,13 +20007,13 @@
   <p:clrMapOvr>
     <a:masterClrMapping/>
   </p:clrMapOvr>
-  <mc:AlternateContent xmlns:mc="http://schemas.openxmlformats.org/markup-compatibility/2006">
-    <mc:Choice xmlns:p14="http://schemas.microsoft.com/office/powerpoint/2010/main" Requires="p14">
+  <mc:AlternateContent xmlns:mc="http://schemas.openxmlformats.org/markup-compatibility/2006" xmlns:p14="http://schemas.microsoft.com/office/powerpoint/2010/main">
+    <mc:Choice Requires="p14">
       <p:transition spd="slow" p14:dur="800">
         <p:circle/>
       </p:transition>
     </mc:Choice>
-    <mc:Fallback>
+    <mc:Fallback xmlns="">
       <p:transition spd="slow">
         <p:circle/>
       </p:transition>
@@ -19972,8 +20072,12 @@
               <a:buNone/>
             </a:pPr>
             <a:r>
+              <a:rPr lang="en-US" b="1" dirty="0"/>
+              <a:t>React</a:t>
+            </a:r>
+            <a:r>
               <a:rPr lang="en-US" dirty="0"/>
-              <a:t>React is a library for creating user </a:t>
+              <a:t> is a library for creating user </a:t>
             </a:r>
             <a:r>
               <a:rPr lang="en-US" dirty="0" smtClean="0"/>
@@ -19988,7 +20092,7 @@
               <a:t> </a:t>
             </a:r>
             <a:r>
-              <a:rPr lang="en-US" dirty="0" err="1"/>
+              <a:rPr lang="en-US" b="1" dirty="0" err="1"/>
               <a:t>ReactDOM</a:t>
             </a:r>
             <a:r>
@@ -19996,12 +20100,24 @@
               <a:t> is a library for web apps that lets you manipulate DOM, just like </a:t>
             </a:r>
             <a:r>
-              <a:rPr lang="en-US" dirty="0" err="1"/>
-              <a:t>jquery</a:t>
+              <a:rPr lang="en-US" dirty="0" smtClean="0"/>
+              <a:t>j</a:t>
+            </a:r>
+            <a:r>
+              <a:rPr lang="bs-Latn-BA" dirty="0" smtClean="0"/>
+              <a:t>Q</a:t>
+            </a:r>
+            <a:r>
+              <a:rPr lang="en-US" dirty="0" err="1" smtClean="0"/>
+              <a:t>uery</a:t>
+            </a:r>
+            <a:r>
+              <a:rPr lang="en-US" dirty="0" smtClean="0"/>
+              <a:t> </a:t>
             </a:r>
             <a:r>
               <a:rPr lang="en-US" dirty="0"/>
-              <a:t> but in react style.</a:t>
+              <a:t>but in react style.</a:t>
             </a:r>
             <a:endParaRPr lang="bs-Latn-BA" dirty="0" smtClean="0"/>
           </a:p>
@@ -20063,13 +20179,13 @@
   <p:clrMapOvr>
     <a:masterClrMapping/>
   </p:clrMapOvr>
-  <mc:AlternateContent xmlns:mc="http://schemas.openxmlformats.org/markup-compatibility/2006">
-    <mc:Choice xmlns:p14="http://schemas.microsoft.com/office/powerpoint/2010/main" Requires="p14">
+  <mc:AlternateContent xmlns:mc="http://schemas.openxmlformats.org/markup-compatibility/2006" xmlns:p14="http://schemas.microsoft.com/office/powerpoint/2010/main">
+    <mc:Choice Requires="p14">
       <p:transition spd="med" p14:dur="700">
         <p:fade/>
       </p:transition>
     </mc:Choice>
-    <mc:Fallback>
+    <mc:Fallback xmlns="">
       <p:transition spd="med">
         <p:fade/>
       </p:transition>
@@ -20153,8 +20269,8 @@
         </p:blipFill>
         <p:spPr>
           <a:xfrm>
-            <a:off x="879764" y="285750"/>
-            <a:ext cx="6954982" cy="1115422"/>
+            <a:off x="914400" y="285750"/>
+            <a:ext cx="6934199" cy="1115422"/>
           </a:xfrm>
           <a:prstGeom prst="rect">
             <a:avLst/>
@@ -20171,13 +20287,13 @@
   <p:clrMapOvr>
     <a:masterClrMapping/>
   </p:clrMapOvr>
-  <mc:AlternateContent xmlns:mc="http://schemas.openxmlformats.org/markup-compatibility/2006">
-    <mc:Choice xmlns:p14="http://schemas.microsoft.com/office/powerpoint/2010/main" Requires="p14">
+  <mc:AlternateContent xmlns:mc="http://schemas.openxmlformats.org/markup-compatibility/2006" xmlns:p14="http://schemas.microsoft.com/office/powerpoint/2010/main">
+    <mc:Choice Requires="p14">
       <p:transition spd="med" p14:dur="700">
         <p:fade/>
       </p:transition>
     </mc:Choice>
-    <mc:Fallback>
+    <mc:Fallback xmlns="">
       <p:transition spd="med">
         <p:fade/>
       </p:transition>

</xml_diff>